<commit_message>
New study from updates.
</commit_message>
<xml_diff>
--- a/figures/flow_chart.pptx
+++ b/figures/flow_chart.pptx
@@ -197,7 +197,7 @@
           <a:p>
             <a:fld id="{38914CBA-7515-48C2-8862-61C6135054A5}" type="datetimeFigureOut">
               <a:rPr lang="en-AU" smtClean="0"/>
-              <a:t>9/07/2019</a:t>
+              <a:t>22/08/2019</a:t>
             </a:fld>
             <a:endParaRPr lang="en-AU"/>
           </a:p>
@@ -680,7 +680,7 @@
           <a:p>
             <a:fld id="{7A9DAA43-D160-4E1A-95AF-14D6F22F310B}" type="datetimeFigureOut">
               <a:rPr lang="en-AU" smtClean="0"/>
-              <a:t>9/07/2019</a:t>
+              <a:t>22/08/2019</a:t>
             </a:fld>
             <a:endParaRPr lang="en-AU"/>
           </a:p>
@@ -850,7 +850,7 @@
           <a:p>
             <a:fld id="{7A9DAA43-D160-4E1A-95AF-14D6F22F310B}" type="datetimeFigureOut">
               <a:rPr lang="en-AU" smtClean="0"/>
-              <a:t>9/07/2019</a:t>
+              <a:t>22/08/2019</a:t>
             </a:fld>
             <a:endParaRPr lang="en-AU"/>
           </a:p>
@@ -1030,7 +1030,7 @@
           <a:p>
             <a:fld id="{7A9DAA43-D160-4E1A-95AF-14D6F22F310B}" type="datetimeFigureOut">
               <a:rPr lang="en-AU" smtClean="0"/>
-              <a:t>9/07/2019</a:t>
+              <a:t>22/08/2019</a:t>
             </a:fld>
             <a:endParaRPr lang="en-AU"/>
           </a:p>
@@ -1200,7 +1200,7 @@
           <a:p>
             <a:fld id="{7A9DAA43-D160-4E1A-95AF-14D6F22F310B}" type="datetimeFigureOut">
               <a:rPr lang="en-AU" smtClean="0"/>
-              <a:t>9/07/2019</a:t>
+              <a:t>22/08/2019</a:t>
             </a:fld>
             <a:endParaRPr lang="en-AU"/>
           </a:p>
@@ -1444,7 +1444,7 @@
           <a:p>
             <a:fld id="{7A9DAA43-D160-4E1A-95AF-14D6F22F310B}" type="datetimeFigureOut">
               <a:rPr lang="en-AU" smtClean="0"/>
-              <a:t>9/07/2019</a:t>
+              <a:t>22/08/2019</a:t>
             </a:fld>
             <a:endParaRPr lang="en-AU"/>
           </a:p>
@@ -1676,7 +1676,7 @@
           <a:p>
             <a:fld id="{7A9DAA43-D160-4E1A-95AF-14D6F22F310B}" type="datetimeFigureOut">
               <a:rPr lang="en-AU" smtClean="0"/>
-              <a:t>9/07/2019</a:t>
+              <a:t>22/08/2019</a:t>
             </a:fld>
             <a:endParaRPr lang="en-AU"/>
           </a:p>
@@ -2043,7 +2043,7 @@
           <a:p>
             <a:fld id="{7A9DAA43-D160-4E1A-95AF-14D6F22F310B}" type="datetimeFigureOut">
               <a:rPr lang="en-AU" smtClean="0"/>
-              <a:t>9/07/2019</a:t>
+              <a:t>22/08/2019</a:t>
             </a:fld>
             <a:endParaRPr lang="en-AU"/>
           </a:p>
@@ -2161,7 +2161,7 @@
           <a:p>
             <a:fld id="{7A9DAA43-D160-4E1A-95AF-14D6F22F310B}" type="datetimeFigureOut">
               <a:rPr lang="en-AU" smtClean="0"/>
-              <a:t>9/07/2019</a:t>
+              <a:t>22/08/2019</a:t>
             </a:fld>
             <a:endParaRPr lang="en-AU"/>
           </a:p>
@@ -2256,7 +2256,7 @@
           <a:p>
             <a:fld id="{7A9DAA43-D160-4E1A-95AF-14D6F22F310B}" type="datetimeFigureOut">
               <a:rPr lang="en-AU" smtClean="0"/>
-              <a:t>9/07/2019</a:t>
+              <a:t>22/08/2019</a:t>
             </a:fld>
             <a:endParaRPr lang="en-AU"/>
           </a:p>
@@ -2533,7 +2533,7 @@
           <a:p>
             <a:fld id="{7A9DAA43-D160-4E1A-95AF-14D6F22F310B}" type="datetimeFigureOut">
               <a:rPr lang="en-AU" smtClean="0"/>
-              <a:t>9/07/2019</a:t>
+              <a:t>22/08/2019</a:t>
             </a:fld>
             <a:endParaRPr lang="en-AU"/>
           </a:p>
@@ -2790,7 +2790,7 @@
           <a:p>
             <a:fld id="{7A9DAA43-D160-4E1A-95AF-14D6F22F310B}" type="datetimeFigureOut">
               <a:rPr lang="en-AU" smtClean="0"/>
-              <a:t>9/07/2019</a:t>
+              <a:t>22/08/2019</a:t>
             </a:fld>
             <a:endParaRPr lang="en-AU"/>
           </a:p>
@@ -3003,7 +3003,7 @@
           <a:p>
             <a:fld id="{7A9DAA43-D160-4E1A-95AF-14D6F22F310B}" type="datetimeFigureOut">
               <a:rPr lang="en-AU" smtClean="0"/>
-              <a:t>9/07/2019</a:t>
+              <a:t>22/08/2019</a:t>
             </a:fld>
             <a:endParaRPr lang="en-AU"/>
           </a:p>
@@ -5034,11 +5034,11 @@
               </a:spcAft>
             </a:pPr>
             <a:r>
-              <a:rPr lang="en-US" altLang="en-US" sz="1101" dirty="0" smtClean="0">
+              <a:rPr lang="en-US" altLang="en-US" sz="1101" smtClean="0">
                 <a:latin typeface="Arial" panose="020B0604020202020204" pitchFamily="34" charset="0"/>
                 <a:cs typeface="Arial" panose="020B0604020202020204" pitchFamily="34" charset="0"/>
               </a:rPr>
-              <a:t>96 </a:t>
+              <a:t>97 </a:t>
             </a:r>
             <a:r>
               <a:rPr lang="en-US" altLang="en-US" sz="1101" dirty="0" smtClean="0">
@@ -5105,7 +5105,7 @@
                 <a:latin typeface="Arial" panose="020B0604020202020204" pitchFamily="34" charset="0"/>
                 <a:cs typeface="Arial" panose="020B0604020202020204" pitchFamily="34" charset="0"/>
               </a:rPr>
-              <a:t>15 </a:t>
+              <a:t>16 </a:t>
             </a:r>
             <a:r>
               <a:rPr lang="en-US" altLang="en-US" sz="1101" dirty="0" smtClean="0">

</xml_diff>

<commit_message>
Update of manual cat.
</commit_message>
<xml_diff>
--- a/figures/flow_chart.pptx
+++ b/figures/flow_chart.pptx
@@ -197,7 +197,7 @@
           <a:p>
             <a:fld id="{38914CBA-7515-48C2-8862-61C6135054A5}" type="datetimeFigureOut">
               <a:rPr lang="en-AU" smtClean="0"/>
-              <a:t>22/08/2019</a:t>
+              <a:t>3/09/2019</a:t>
             </a:fld>
             <a:endParaRPr lang="en-AU"/>
           </a:p>
@@ -680,7 +680,7 @@
           <a:p>
             <a:fld id="{7A9DAA43-D160-4E1A-95AF-14D6F22F310B}" type="datetimeFigureOut">
               <a:rPr lang="en-AU" smtClean="0"/>
-              <a:t>22/08/2019</a:t>
+              <a:t>3/09/2019</a:t>
             </a:fld>
             <a:endParaRPr lang="en-AU"/>
           </a:p>
@@ -850,7 +850,7 @@
           <a:p>
             <a:fld id="{7A9DAA43-D160-4E1A-95AF-14D6F22F310B}" type="datetimeFigureOut">
               <a:rPr lang="en-AU" smtClean="0"/>
-              <a:t>22/08/2019</a:t>
+              <a:t>3/09/2019</a:t>
             </a:fld>
             <a:endParaRPr lang="en-AU"/>
           </a:p>
@@ -1030,7 +1030,7 @@
           <a:p>
             <a:fld id="{7A9DAA43-D160-4E1A-95AF-14D6F22F310B}" type="datetimeFigureOut">
               <a:rPr lang="en-AU" smtClean="0"/>
-              <a:t>22/08/2019</a:t>
+              <a:t>3/09/2019</a:t>
             </a:fld>
             <a:endParaRPr lang="en-AU"/>
           </a:p>
@@ -1200,7 +1200,7 @@
           <a:p>
             <a:fld id="{7A9DAA43-D160-4E1A-95AF-14D6F22F310B}" type="datetimeFigureOut">
               <a:rPr lang="en-AU" smtClean="0"/>
-              <a:t>22/08/2019</a:t>
+              <a:t>3/09/2019</a:t>
             </a:fld>
             <a:endParaRPr lang="en-AU"/>
           </a:p>
@@ -1444,7 +1444,7 @@
           <a:p>
             <a:fld id="{7A9DAA43-D160-4E1A-95AF-14D6F22F310B}" type="datetimeFigureOut">
               <a:rPr lang="en-AU" smtClean="0"/>
-              <a:t>22/08/2019</a:t>
+              <a:t>3/09/2019</a:t>
             </a:fld>
             <a:endParaRPr lang="en-AU"/>
           </a:p>
@@ -1676,7 +1676,7 @@
           <a:p>
             <a:fld id="{7A9DAA43-D160-4E1A-95AF-14D6F22F310B}" type="datetimeFigureOut">
               <a:rPr lang="en-AU" smtClean="0"/>
-              <a:t>22/08/2019</a:t>
+              <a:t>3/09/2019</a:t>
             </a:fld>
             <a:endParaRPr lang="en-AU"/>
           </a:p>
@@ -2043,7 +2043,7 @@
           <a:p>
             <a:fld id="{7A9DAA43-D160-4E1A-95AF-14D6F22F310B}" type="datetimeFigureOut">
               <a:rPr lang="en-AU" smtClean="0"/>
-              <a:t>22/08/2019</a:t>
+              <a:t>3/09/2019</a:t>
             </a:fld>
             <a:endParaRPr lang="en-AU"/>
           </a:p>
@@ -2161,7 +2161,7 @@
           <a:p>
             <a:fld id="{7A9DAA43-D160-4E1A-95AF-14D6F22F310B}" type="datetimeFigureOut">
               <a:rPr lang="en-AU" smtClean="0"/>
-              <a:t>22/08/2019</a:t>
+              <a:t>3/09/2019</a:t>
             </a:fld>
             <a:endParaRPr lang="en-AU"/>
           </a:p>
@@ -2256,7 +2256,7 @@
           <a:p>
             <a:fld id="{7A9DAA43-D160-4E1A-95AF-14D6F22F310B}" type="datetimeFigureOut">
               <a:rPr lang="en-AU" smtClean="0"/>
-              <a:t>22/08/2019</a:t>
+              <a:t>3/09/2019</a:t>
             </a:fld>
             <a:endParaRPr lang="en-AU"/>
           </a:p>
@@ -2533,7 +2533,7 @@
           <a:p>
             <a:fld id="{7A9DAA43-D160-4E1A-95AF-14D6F22F310B}" type="datetimeFigureOut">
               <a:rPr lang="en-AU" smtClean="0"/>
-              <a:t>22/08/2019</a:t>
+              <a:t>3/09/2019</a:t>
             </a:fld>
             <a:endParaRPr lang="en-AU"/>
           </a:p>
@@ -2790,7 +2790,7 @@
           <a:p>
             <a:fld id="{7A9DAA43-D160-4E1A-95AF-14D6F22F310B}" type="datetimeFigureOut">
               <a:rPr lang="en-AU" smtClean="0"/>
-              <a:t>22/08/2019</a:t>
+              <a:t>3/09/2019</a:t>
             </a:fld>
             <a:endParaRPr lang="en-AU"/>
           </a:p>
@@ -3003,7 +3003,7 @@
           <a:p>
             <a:fld id="{7A9DAA43-D160-4E1A-95AF-14D6F22F310B}" type="datetimeFigureOut">
               <a:rPr lang="en-AU" smtClean="0"/>
-              <a:t>22/08/2019</a:t>
+              <a:t>3/09/2019</a:t>
             </a:fld>
             <a:endParaRPr lang="en-AU"/>
           </a:p>
@@ -4978,7 +4978,14 @@
                 <a:latin typeface="Arial" panose="020B0604020202020204" pitchFamily="34" charset="0"/>
                 <a:cs typeface="Arial" panose="020B0604020202020204" pitchFamily="34" charset="0"/>
               </a:rPr>
-              <a:t>27 records included – manual search</a:t>
+              <a:t>26 </a:t>
+            </a:r>
+            <a:r>
+              <a:rPr lang="en-US" altLang="en-US" sz="1101" dirty="0" smtClean="0">
+                <a:latin typeface="Arial" panose="020B0604020202020204" pitchFamily="34" charset="0"/>
+                <a:cs typeface="Arial" panose="020B0604020202020204" pitchFamily="34" charset="0"/>
+              </a:rPr>
+              <a:t>records included – manual search</a:t>
             </a:r>
             <a:endParaRPr lang="en-US" altLang="en-US" sz="1101" dirty="0">
               <a:latin typeface="Arial" panose="020B0604020202020204" pitchFamily="34" charset="0"/>
@@ -5038,7 +5045,7 @@
                 <a:latin typeface="Arial" panose="020B0604020202020204" pitchFamily="34" charset="0"/>
                 <a:cs typeface="Arial" panose="020B0604020202020204" pitchFamily="34" charset="0"/>
               </a:rPr>
-              <a:t>97 </a:t>
+              <a:t>96 </a:t>
             </a:r>
             <a:r>
               <a:rPr lang="en-US" altLang="en-US" sz="1101" dirty="0" smtClean="0">
@@ -5105,14 +5112,7 @@
                 <a:latin typeface="Arial" panose="020B0604020202020204" pitchFamily="34" charset="0"/>
                 <a:cs typeface="Arial" panose="020B0604020202020204" pitchFamily="34" charset="0"/>
               </a:rPr>
-              <a:t>16 </a:t>
-            </a:r>
-            <a:r>
-              <a:rPr lang="en-US" altLang="en-US" sz="1101" dirty="0" smtClean="0">
-                <a:latin typeface="Arial" panose="020B0604020202020204" pitchFamily="34" charset="0"/>
-                <a:cs typeface="Arial" panose="020B0604020202020204" pitchFamily="34" charset="0"/>
-              </a:rPr>
-              <a:t>records included - updates</a:t>
+              <a:t>16 records included - updates</a:t>
             </a:r>
             <a:endParaRPr lang="en-US" altLang="en-US" sz="1101" dirty="0">
               <a:latin typeface="Arial" panose="020B0604020202020204" pitchFamily="34" charset="0"/>

</xml_diff>